<commit_message>
Make stims and fix screen resolution (and other bugs)
</commit_message>
<xml_diff>
--- a/docs/perception/perception_instruction_slide.pptx
+++ b/docs/perception/perception_instruction_slide.pptx
@@ -112,6 +112,10 @@
 </p:presentation>
 </file>
 
+<file path=ppt/revisionInfo.xml><?xml version="1.0" encoding="utf-8"?>
+<p1510:revInfo xmlns:a="http://schemas.openxmlformats.org/drawingml/2006/main" xmlns:r="http://schemas.openxmlformats.org/officeDocument/2006/relationships" xmlns:p1510="http://schemas.microsoft.com/office/powerpoint/2015/10/main"/>
+</file>
+
 <file path=ppt/slideLayouts/slideLayout1.xml><?xml version="1.0" encoding="utf-8"?>
 <p:sldLayout xmlns:a="http://schemas.openxmlformats.org/drawingml/2006/main" xmlns:r="http://schemas.openxmlformats.org/officeDocument/2006/relationships" xmlns:p="http://schemas.openxmlformats.org/presentationml/2006/main" type="title" preserve="1">
   <p:cSld name="Title Slide">
@@ -243,7 +247,7 @@
           <a:p>
             <a:fld id="{F829977F-8E80-4A9E-9266-80D81053DA3F}" type="datetimeFigureOut">
               <a:rPr lang="en-US" smtClean="0"/>
-              <a:t>1/23/2017</a:t>
+              <a:t>11/5/2017</a:t>
             </a:fld>
             <a:endParaRPr lang="en-US"/>
           </a:p>
@@ -413,7 +417,7 @@
           <a:p>
             <a:fld id="{F829977F-8E80-4A9E-9266-80D81053DA3F}" type="datetimeFigureOut">
               <a:rPr lang="en-US" smtClean="0"/>
-              <a:t>1/23/2017</a:t>
+              <a:t>11/5/2017</a:t>
             </a:fld>
             <a:endParaRPr lang="en-US"/>
           </a:p>
@@ -593,7 +597,7 @@
           <a:p>
             <a:fld id="{F829977F-8E80-4A9E-9266-80D81053DA3F}" type="datetimeFigureOut">
               <a:rPr lang="en-US" smtClean="0"/>
-              <a:t>1/23/2017</a:t>
+              <a:t>11/5/2017</a:t>
             </a:fld>
             <a:endParaRPr lang="en-US"/>
           </a:p>
@@ -763,7 +767,7 @@
           <a:p>
             <a:fld id="{F829977F-8E80-4A9E-9266-80D81053DA3F}" type="datetimeFigureOut">
               <a:rPr lang="en-US" smtClean="0"/>
-              <a:t>1/23/2017</a:t>
+              <a:t>11/5/2017</a:t>
             </a:fld>
             <a:endParaRPr lang="en-US"/>
           </a:p>
@@ -1007,7 +1011,7 @@
           <a:p>
             <a:fld id="{F829977F-8E80-4A9E-9266-80D81053DA3F}" type="datetimeFigureOut">
               <a:rPr lang="en-US" smtClean="0"/>
-              <a:t>1/23/2017</a:t>
+              <a:t>11/5/2017</a:t>
             </a:fld>
             <a:endParaRPr lang="en-US"/>
           </a:p>
@@ -1239,7 +1243,7 @@
           <a:p>
             <a:fld id="{F829977F-8E80-4A9E-9266-80D81053DA3F}" type="datetimeFigureOut">
               <a:rPr lang="en-US" smtClean="0"/>
-              <a:t>1/23/2017</a:t>
+              <a:t>11/5/2017</a:t>
             </a:fld>
             <a:endParaRPr lang="en-US"/>
           </a:p>
@@ -1606,7 +1610,7 @@
           <a:p>
             <a:fld id="{F829977F-8E80-4A9E-9266-80D81053DA3F}" type="datetimeFigureOut">
               <a:rPr lang="en-US" smtClean="0"/>
-              <a:t>1/23/2017</a:t>
+              <a:t>11/5/2017</a:t>
             </a:fld>
             <a:endParaRPr lang="en-US"/>
           </a:p>
@@ -1724,7 +1728,7 @@
           <a:p>
             <a:fld id="{F829977F-8E80-4A9E-9266-80D81053DA3F}" type="datetimeFigureOut">
               <a:rPr lang="en-US" smtClean="0"/>
-              <a:t>1/23/2017</a:t>
+              <a:t>11/5/2017</a:t>
             </a:fld>
             <a:endParaRPr lang="en-US"/>
           </a:p>
@@ -1819,7 +1823,7 @@
           <a:p>
             <a:fld id="{F829977F-8E80-4A9E-9266-80D81053DA3F}" type="datetimeFigureOut">
               <a:rPr lang="en-US" smtClean="0"/>
-              <a:t>1/23/2017</a:t>
+              <a:t>11/5/2017</a:t>
             </a:fld>
             <a:endParaRPr lang="en-US"/>
           </a:p>
@@ -2096,7 +2100,7 @@
           <a:p>
             <a:fld id="{F829977F-8E80-4A9E-9266-80D81053DA3F}" type="datetimeFigureOut">
               <a:rPr lang="en-US" smtClean="0"/>
-              <a:t>1/23/2017</a:t>
+              <a:t>11/5/2017</a:t>
             </a:fld>
             <a:endParaRPr lang="en-US"/>
           </a:p>
@@ -2353,7 +2357,7 @@
           <a:p>
             <a:fld id="{F829977F-8E80-4A9E-9266-80D81053DA3F}" type="datetimeFigureOut">
               <a:rPr lang="en-US" smtClean="0"/>
-              <a:t>1/23/2017</a:t>
+              <a:t>11/5/2017</a:t>
             </a:fld>
             <a:endParaRPr lang="en-US"/>
           </a:p>
@@ -2566,7 +2570,7 @@
           <a:p>
             <a:fld id="{F829977F-8E80-4A9E-9266-80D81053DA3F}" type="datetimeFigureOut">
               <a:rPr lang="en-US" smtClean="0"/>
-              <a:t>1/23/2017</a:t>
+              <a:t>11/5/2017</a:t>
             </a:fld>
             <a:endParaRPr lang="en-US"/>
           </a:p>
@@ -3012,31 +3016,15 @@
           </a:p>
           <a:p>
             <a:r>
-              <a:rPr lang="en-US" dirty="0" smtClean="0">
-                <a:solidFill>
-                  <a:schemeClr val="bg1"/>
-                </a:solidFill>
-              </a:rPr>
-              <a:t>The objects will be </a:t>
-            </a:r>
-            <a:r>
               <a:rPr lang="en-US" dirty="0">
                 <a:solidFill>
                   <a:schemeClr val="bg1"/>
                 </a:solidFill>
               </a:rPr>
-              <a:t>presented very briefly. Your task is to determine if the </a:t>
-            </a:r>
-            <a:r>
-              <a:rPr lang="en-US" dirty="0" smtClean="0">
-                <a:solidFill>
-                  <a:schemeClr val="bg1"/>
-                </a:solidFill>
-              </a:rPr>
-              <a:t>all of the objects on the screen are rotated the </a:t>
-            </a:r>
-            <a:r>
-              <a:rPr lang="en-US" b="1" u="sng" dirty="0" smtClean="0">
+              <a:t>The objects will be presented very briefly. Your task is to determine if the all of the objects on the screen have the </a:t>
+            </a:r>
+            <a:r>
+              <a:rPr lang="en-US" b="1" u="sng" dirty="0">
                 <a:solidFill>
                   <a:schemeClr val="bg1"/>
                 </a:solidFill>
@@ -3044,15 +3032,15 @@
               <a:t>same</a:t>
             </a:r>
             <a:r>
-              <a:rPr lang="en-US" dirty="0" smtClean="0">
+              <a:rPr lang="en-US" dirty="0">
                 <a:solidFill>
                   <a:schemeClr val="bg1"/>
                 </a:solidFill>
               </a:rPr>
-              <a:t>, or if one of the objects in the display had a </a:t>
-            </a:r>
-            <a:r>
-              <a:rPr lang="en-US" b="1" u="sng" dirty="0" smtClean="0">
+              <a:t> rotation, or if one of the objects in the set has a </a:t>
+            </a:r>
+            <a:r>
+              <a:rPr lang="en-US" b="1" u="sng" dirty="0">
                 <a:solidFill>
                   <a:schemeClr val="bg1"/>
                 </a:solidFill>
@@ -3065,39 +3053,7 @@
                   <a:schemeClr val="bg1"/>
                 </a:solidFill>
               </a:rPr>
-              <a:t> </a:t>
-            </a:r>
-            <a:r>
-              <a:rPr lang="en-US" dirty="0" smtClean="0">
-                <a:solidFill>
-                  <a:schemeClr val="bg1"/>
-                </a:solidFill>
-              </a:rPr>
-              <a:t>rotation. If </a:t>
-            </a:r>
-            <a:r>
-              <a:rPr lang="en-US" dirty="0">
-                <a:solidFill>
-                  <a:schemeClr val="bg1"/>
-                </a:solidFill>
-              </a:rPr>
-              <a:t>the </a:t>
-            </a:r>
-            <a:r>
-              <a:rPr lang="en-US" dirty="0" smtClean="0">
-                <a:solidFill>
-                  <a:schemeClr val="bg1"/>
-                </a:solidFill>
-              </a:rPr>
-              <a:t>all of the objects are rotated the same, press the “F” key. If one of the 2 or 4 objects is rotated differently than the rest, press the “J” key on the keyboard.  </a:t>
-            </a:r>
-            <a:r>
-              <a:rPr lang="en-US" dirty="0">
-                <a:solidFill>
-                  <a:schemeClr val="bg1"/>
-                </a:solidFill>
-              </a:rPr>
-              <a:t>It is important to keep your eyes fixated on the ‘+’ in the center of the screen at all times. </a:t>
+              <a:t> rotation. If the all of the objects have the same rotation, press the “F” key. If one of the objects is rotated differently than the rest, press the “J” key on the keyboard. It is important to keep your eyes fixated on the ‘+’ in the center of the screen at all times. </a:t>
             </a:r>
           </a:p>
         </p:txBody>
@@ -3130,15 +3086,7 @@
                   <a:schemeClr val="bg1"/>
                 </a:solidFill>
               </a:rPr>
-              <a:t>After the </a:t>
-            </a:r>
-            <a:r>
-              <a:rPr lang="en-US" dirty="0" smtClean="0">
-                <a:solidFill>
-                  <a:schemeClr val="bg1"/>
-                </a:solidFill>
-              </a:rPr>
-              <a:t>object display disappears, you will see a </a:t>
+              <a:t>Enter your response when you see the </a:t>
             </a:r>
             <a:r>
               <a:rPr lang="en-US" dirty="0">
@@ -3154,7 +3102,7 @@
                   <a:schemeClr val="bg1"/>
                 </a:solidFill>
               </a:rPr>
-              <a:t>. When you see the </a:t>
+              <a:t> (with a response scale below it). When you see the </a:t>
             </a:r>
             <a:r>
               <a:rPr lang="en-US" dirty="0">
@@ -3170,18 +3118,10 @@
                   <a:schemeClr val="bg1"/>
                 </a:solidFill>
               </a:rPr>
-              <a:t>, you should enter your response </a:t>
-            </a:r>
-            <a:r>
-              <a:rPr lang="en-US" dirty="0" smtClean="0">
-                <a:solidFill>
-                  <a:schemeClr val="bg1"/>
-                </a:solidFill>
-              </a:rPr>
-              <a:t>as quickly and accurately as possible. Prior to each new object trial you will see a </a:t>
-            </a:r>
-            <a:r>
-              <a:rPr lang="en-US" dirty="0" smtClean="0">
+              <a:t>, you should enter your response as quickly and accurately as possible. Prior to trial you will see a </a:t>
+            </a:r>
+            <a:r>
+              <a:rPr lang="en-US" dirty="0">
                 <a:solidFill>
                   <a:srgbClr val="00FF00"/>
                 </a:solidFill>
@@ -3189,58 +3129,16 @@
               <a:t>+</a:t>
             </a:r>
             <a:r>
-              <a:rPr lang="en-US" dirty="0" smtClean="0">
-                <a:solidFill>
-                  <a:schemeClr val="bg1"/>
-                </a:solidFill>
-              </a:rPr>
-              <a:t>. Do </a:t>
-            </a:r>
-            <a:r>
               <a:rPr lang="en-US" dirty="0">
                 <a:solidFill>
                   <a:schemeClr val="bg1"/>
                 </a:solidFill>
               </a:rPr>
-              <a:t>you have any questions?</a:t>
-            </a:r>
-          </a:p>
-        </p:txBody>
-      </p:sp>
-      <p:pic>
-        <p:nvPicPr>
-          <p:cNvPr id="2" name="Picture 1"/>
-          <p:cNvPicPr>
-            <a:picLocks noChangeAspect="1"/>
-          </p:cNvPicPr>
-          <p:nvPr/>
-        </p:nvPicPr>
-        <p:blipFill rotWithShape="1">
-          <a:blip r:embed="rId2">
-            <a:extLst>
-              <a:ext uri="{28A0092B-C50C-407E-A947-70E740481C1C}">
-                <a14:useLocalDpi xmlns:a14="http://schemas.microsoft.com/office/drawing/2010/main" val="0"/>
-              </a:ext>
-            </a:extLst>
-          </a:blip>
-          <a:srcRect l="33846" t="32598" r="31513" b="34037"/>
-          <a:stretch/>
-        </p:blipFill>
-        <p:spPr>
-          <a:xfrm>
-            <a:off x="1075818" y="3217856"/>
-            <a:ext cx="3167627" cy="1702952"/>
-          </a:xfrm>
-          <a:prstGeom prst="rect">
-            <a:avLst/>
-          </a:prstGeom>
-          <a:ln w="22225">
-            <a:solidFill>
-              <a:schemeClr val="bg1"/>
-            </a:solidFill>
-          </a:ln>
-        </p:spPr>
-      </p:pic>
+              <a:t>. Do you have any questions?</a:t>
+            </a:r>
+          </a:p>
+        </p:txBody>
+      </p:sp>
       <p:pic>
         <p:nvPicPr>
           <p:cNvPr id="3" name="Picture 2"/>
@@ -3250,7 +3148,7 @@
           <p:nvPr/>
         </p:nvPicPr>
         <p:blipFill rotWithShape="1">
-          <a:blip r:embed="rId3">
+          <a:blip r:embed="rId2">
             <a:extLst>
               <a:ext uri="{28A0092B-C50C-407E-A947-70E740481C1C}">
                 <a14:useLocalDpi xmlns:a14="http://schemas.microsoft.com/office/drawing/2010/main" val="0"/>
@@ -3299,18 +3197,13 @@
           <a:p>
             <a:pPr algn="ctr"/>
             <a:r>
-              <a:rPr lang="en-US" b="1" u="sng" dirty="0" smtClean="0">
+              <a:rPr lang="en-US" b="1" u="sng" dirty="0">
                 <a:solidFill>
                   <a:schemeClr val="bg1"/>
                 </a:solidFill>
               </a:rPr>
               <a:t>Different</a:t>
             </a:r>
-            <a:endParaRPr lang="en-US" b="1" u="sng" dirty="0">
-              <a:solidFill>
-                <a:schemeClr val="bg1"/>
-              </a:solidFill>
-            </a:endParaRPr>
           </a:p>
         </p:txBody>
       </p:sp>
@@ -3338,21 +3231,56 @@
           <a:p>
             <a:pPr algn="ctr"/>
             <a:r>
-              <a:rPr lang="en-US" b="1" u="sng" dirty="0" smtClean="0">
+              <a:rPr lang="en-US" b="1" u="sng" dirty="0">
                 <a:solidFill>
                   <a:schemeClr val="bg1"/>
                 </a:solidFill>
               </a:rPr>
               <a:t>Same</a:t>
             </a:r>
-            <a:endParaRPr lang="en-US" b="1" u="sng" dirty="0">
-              <a:solidFill>
-                <a:schemeClr val="bg1"/>
-              </a:solidFill>
-            </a:endParaRPr>
-          </a:p>
-        </p:txBody>
-      </p:sp>
+          </a:p>
+        </p:txBody>
+      </p:sp>
+      <p:pic>
+        <p:nvPicPr>
+          <p:cNvPr id="5" name="Picture 4">
+            <a:extLst>
+              <a:ext uri="{FF2B5EF4-FFF2-40B4-BE49-F238E27FC236}">
+                <a16:creationId xmlns:a16="http://schemas.microsoft.com/office/drawing/2014/main" id="{CB1419E2-AF5A-41F3-B11E-B5C3C37CDB99}"/>
+              </a:ext>
+            </a:extLst>
+          </p:cNvPr>
+          <p:cNvPicPr>
+            <a:picLocks noChangeAspect="1"/>
+          </p:cNvPicPr>
+          <p:nvPr/>
+        </p:nvPicPr>
+        <p:blipFill rotWithShape="1">
+          <a:blip r:embed="rId3">
+            <a:extLst>
+              <a:ext uri="{28A0092B-C50C-407E-A947-70E740481C1C}">
+                <a14:useLocalDpi xmlns:a14="http://schemas.microsoft.com/office/drawing/2010/main" val="0"/>
+              </a:ext>
+            </a:extLst>
+          </a:blip>
+          <a:srcRect l="33151" t="33506" r="33295" b="40692"/>
+          <a:stretch/>
+        </p:blipFill>
+        <p:spPr>
+          <a:xfrm>
+            <a:off x="1227115" y="3242681"/>
+            <a:ext cx="3068232" cy="1712600"/>
+          </a:xfrm>
+          <a:prstGeom prst="rect">
+            <a:avLst/>
+          </a:prstGeom>
+          <a:ln w="22225">
+            <a:solidFill>
+              <a:schemeClr val="bg1"/>
+            </a:solidFill>
+          </a:ln>
+        </p:spPr>
+      </p:pic>
     </p:spTree>
     <p:extLst>
       <p:ext uri="{BB962C8B-B14F-4D97-AF65-F5344CB8AC3E}">

</xml_diff>